<commit_message>
Edits to VMSG slides
</commit_message>
<xml_diff>
--- a/VMSG_Workshop_2021/Session 3/VMSG_Session3_Lecture.pptx
+++ b/VMSG_Workshop_2021/Session 3/VMSG_Session3_Lecture.pptx
@@ -220,7 +220,7 @@
           <a:p>
             <a:fld id="{A5C20BB3-3CCB-4FE5-991B-82F6BCB48AF3}" type="datetimeFigureOut">
               <a:rPr lang="en-US" smtClean="0"/>
-              <a:t>11/16/21</a:t>
+              <a:t>11/17/21</a:t>
             </a:fld>
             <a:endParaRPr lang="en-US"/>
           </a:p>
@@ -826,7 +826,7 @@
           <a:p>
             <a:fld id="{87645D96-3108-B545-9B42-23C24617A283}" type="datetime1">
               <a:rPr lang="en-US" smtClean="0"/>
-              <a:t>11/16/21</a:t>
+              <a:t>11/17/21</a:t>
             </a:fld>
             <a:endParaRPr lang="en-US" dirty="0"/>
           </a:p>
@@ -1234,7 +1234,7 @@
           <a:p>
             <a:fld id="{70C19497-7443-3649-BD98-86E7AA467390}" type="datetime1">
               <a:rPr lang="en-US" smtClean="0"/>
-              <a:t>11/16/21</a:t>
+              <a:t>11/17/21</a:t>
             </a:fld>
             <a:endParaRPr lang="en-US" dirty="0"/>
           </a:p>
@@ -1446,7 +1446,7 @@
           <a:p>
             <a:fld id="{B1C12939-C404-CD42-9389-BDB8482DAA01}" type="datetime1">
               <a:rPr lang="en-US" smtClean="0"/>
-              <a:t>11/16/21</a:t>
+              <a:t>11/17/21</a:t>
             </a:fld>
             <a:endParaRPr lang="en-US" dirty="0"/>
           </a:p>
@@ -1680,7 +1680,7 @@
           <a:p>
             <a:fld id="{0C058645-6F24-9C43-8FC3-443F02031404}" type="datetime1">
               <a:rPr lang="en-US" smtClean="0"/>
-              <a:t>11/16/21</a:t>
+              <a:t>11/17/21</a:t>
             </a:fld>
             <a:endParaRPr lang="en-US" dirty="0"/>
           </a:p>
@@ -1969,7 +1969,7 @@
           <a:p>
             <a:fld id="{453754D5-8BE9-294A-B481-283E1E39E0CC}" type="datetime1">
               <a:rPr lang="en-US" smtClean="0"/>
-              <a:t>11/16/21</a:t>
+              <a:t>11/17/21</a:t>
             </a:fld>
             <a:endParaRPr lang="en-US" dirty="0"/>
           </a:p>
@@ -2359,7 +2359,7 @@
           <a:p>
             <a:fld id="{CA2FF639-FC09-5F4A-B23C-8B1FDDDDEFBF}" type="datetime1">
               <a:rPr lang="en-US" smtClean="0"/>
-              <a:t>11/16/21</a:t>
+              <a:t>11/17/21</a:t>
             </a:fld>
             <a:endParaRPr lang="en-US" dirty="0"/>
           </a:p>
@@ -2875,7 +2875,7 @@
           <a:p>
             <a:fld id="{FC355047-41C0-8641-9CD9-E597560F38B5}" type="datetime1">
               <a:rPr lang="en-US" smtClean="0"/>
-              <a:t>11/16/21</a:t>
+              <a:t>11/17/21</a:t>
             </a:fld>
             <a:endParaRPr lang="en-US" dirty="0"/>
           </a:p>
@@ -3037,7 +3037,7 @@
           <a:p>
             <a:fld id="{36C54D54-7A92-A645-BFCE-8BE6B8068A7A}" type="datetime1">
               <a:rPr lang="en-US" smtClean="0"/>
-              <a:t>11/16/21</a:t>
+              <a:t>11/17/21</a:t>
             </a:fld>
             <a:endParaRPr lang="en-US" dirty="0"/>
           </a:p>
@@ -3170,7 +3170,7 @@
           <a:p>
             <a:fld id="{B6F76746-A03E-1446-B7CF-798FC3EE1D94}" type="datetime1">
               <a:rPr lang="en-US" smtClean="0"/>
-              <a:t>11/16/21</a:t>
+              <a:t>11/17/21</a:t>
             </a:fld>
             <a:endParaRPr lang="en-US" dirty="0"/>
           </a:p>
@@ -3509,7 +3509,7 @@
           <a:p>
             <a:fld id="{4152640C-FBCD-2845-990D-FAE60167BFE2}" type="datetime1">
               <a:rPr lang="en-US" smtClean="0"/>
-              <a:t>11/16/21</a:t>
+              <a:t>11/17/21</a:t>
             </a:fld>
             <a:endParaRPr lang="en-US" dirty="0"/>
           </a:p>
@@ -3879,7 +3879,7 @@
           <a:p>
             <a:fld id="{57BE5EE7-EBBE-D047-A622-014412DFBC0F}" type="datetime1">
               <a:rPr lang="en-US" smtClean="0"/>
-              <a:t>11/16/21</a:t>
+              <a:t>11/17/21</a:t>
             </a:fld>
             <a:endParaRPr lang="en-US" dirty="0"/>
           </a:p>
@@ -4166,7 +4166,7 @@
           <a:p>
             <a:fld id="{70D1B046-536E-594E-9C7D-0944F6913C4A}" type="datetime1">
               <a:rPr lang="en-US" smtClean="0"/>
-              <a:t>11/16/21</a:t>
+              <a:t>11/17/21</a:t>
             </a:fld>
             <a:endParaRPr lang="en-US" dirty="0"/>
           </a:p>
@@ -5285,7 +5285,7 @@
           <a:p>
             <a:fld id="{0C058645-6F24-9C43-8FC3-443F02031404}" type="datetime1">
               <a:rPr lang="en-US" smtClean="0"/>
-              <a:t>11/16/21</a:t>
+              <a:t>11/17/21</a:t>
             </a:fld>
             <a:endParaRPr lang="en-US" dirty="0"/>
           </a:p>
@@ -5545,7 +5545,7 @@
           <a:p>
             <a:fld id="{0C058645-6F24-9C43-8FC3-443F02031404}" type="datetime1">
               <a:rPr lang="en-US" smtClean="0"/>
-              <a:t>11/16/21</a:t>
+              <a:t>11/17/21</a:t>
             </a:fld>
             <a:endParaRPr lang="en-US" dirty="0"/>
           </a:p>
@@ -5763,7 +5763,7 @@
           <a:p>
             <a:fld id="{0C058645-6F24-9C43-8FC3-443F02031404}" type="datetime1">
               <a:rPr lang="en-US" smtClean="0"/>
-              <a:t>11/16/21</a:t>
+              <a:t>11/17/21</a:t>
             </a:fld>
             <a:endParaRPr lang="en-US" dirty="0"/>
           </a:p>
@@ -5926,7 +5926,7 @@
           <a:p>
             <a:fld id="{453754D5-8BE9-294A-B481-283E1E39E0CC}" type="datetime1">
               <a:rPr lang="en-US" smtClean="0"/>
-              <a:t>11/16/21</a:t>
+              <a:t>11/17/21</a:t>
             </a:fld>
             <a:endParaRPr lang="en-US" dirty="0"/>
           </a:p>
@@ -6212,7 +6212,7 @@
           <a:p>
             <a:fld id="{0C058645-6F24-9C43-8FC3-443F02031404}" type="datetime1">
               <a:rPr lang="en-US" smtClean="0"/>
-              <a:t>11/16/21</a:t>
+              <a:t>11/17/21</a:t>
             </a:fld>
             <a:endParaRPr lang="en-US" dirty="0"/>
           </a:p>
@@ -6716,7 +6716,7 @@
           <a:p>
             <a:fld id="{453754D5-8BE9-294A-B481-283E1E39E0CC}" type="datetime1">
               <a:rPr lang="en-US" smtClean="0"/>
-              <a:t>11/16/21</a:t>
+              <a:t>11/17/21</a:t>
             </a:fld>
             <a:endParaRPr lang="en-US" dirty="0"/>
           </a:p>
@@ -7014,7 +7014,7 @@
           <a:p>
             <a:fld id="{0C058645-6F24-9C43-8FC3-443F02031404}" type="datetime1">
               <a:rPr lang="en-US" smtClean="0"/>
-              <a:t>11/16/21</a:t>
+              <a:t>11/17/21</a:t>
             </a:fld>
             <a:endParaRPr lang="en-US" dirty="0"/>
           </a:p>
@@ -7206,7 +7206,7 @@
           <a:p>
             <a:fld id="{0C058645-6F24-9C43-8FC3-443F02031404}" type="datetime1">
               <a:rPr lang="en-US" smtClean="0"/>
-              <a:t>11/16/21</a:t>
+              <a:t>11/17/21</a:t>
             </a:fld>
             <a:endParaRPr lang="en-US" dirty="0"/>
           </a:p>
@@ -7503,7 +7503,7 @@
           <a:p>
             <a:fld id="{0C058645-6F24-9C43-8FC3-443F02031404}" type="datetime1">
               <a:rPr lang="en-US" smtClean="0"/>
-              <a:t>11/16/21</a:t>
+              <a:t>11/17/21</a:t>
             </a:fld>
             <a:endParaRPr lang="en-US" dirty="0"/>
           </a:p>
@@ -7755,7 +7755,7 @@
           <a:p>
             <a:fld id="{0C058645-6F24-9C43-8FC3-443F02031404}" type="datetime1">
               <a:rPr lang="en-US" smtClean="0"/>
-              <a:t>11/16/21</a:t>
+              <a:t>11/17/21</a:t>
             </a:fld>
             <a:endParaRPr lang="en-US" dirty="0"/>
           </a:p>
@@ -8284,7 +8284,7 @@
           <a:p>
             <a:fld id="{0C058645-6F24-9C43-8FC3-443F02031404}" type="datetime1">
               <a:rPr lang="en-US" smtClean="0"/>
-              <a:t>11/16/21</a:t>
+              <a:t>11/17/21</a:t>
             </a:fld>
             <a:endParaRPr lang="en-US" dirty="0"/>
           </a:p>
@@ -8889,7 +8889,7 @@
           <a:p>
             <a:fld id="{0C058645-6F24-9C43-8FC3-443F02031404}" type="datetime1">
               <a:rPr lang="en-US" smtClean="0"/>
-              <a:t>11/16/21</a:t>
+              <a:t>11/17/21</a:t>
             </a:fld>
             <a:endParaRPr lang="en-US" dirty="0"/>
           </a:p>
@@ -9080,7 +9080,7 @@
           <a:p>
             <a:fld id="{453754D5-8BE9-294A-B481-283E1E39E0CC}" type="datetime1">
               <a:rPr lang="en-US" smtClean="0"/>
-              <a:t>11/16/21</a:t>
+              <a:t>11/17/21</a:t>
             </a:fld>
             <a:endParaRPr lang="en-US" dirty="0"/>
           </a:p>
@@ -9227,7 +9227,7 @@
           <a:p>
             <a:fld id="{0C058645-6F24-9C43-8FC3-443F02031404}" type="datetime1">
               <a:rPr lang="en-US" smtClean="0"/>
-              <a:t>11/16/21</a:t>
+              <a:t>11/17/21</a:t>
             </a:fld>
             <a:endParaRPr lang="en-US" dirty="0"/>
           </a:p>
@@ -9410,10 +9410,28 @@
           <a:p>
             <a:r>
               <a:rPr lang="en-US" b="1" dirty="0"/>
-              <a:t>Experiment with symbology! When you submit your maps, I want to see different color scales, different polygon textures, different fonts. </a:t>
-            </a:r>
-          </a:p>
-          <a:p>
+              <a:t>Experiment with symbology! </a:t>
+            </a:r>
+          </a:p>
+          <a:p>
+            <a:r>
+              <a:rPr lang="en-US" b="1" dirty="0"/>
+              <a:t>Make symbols color blind friendly! (see </a:t>
+            </a:r>
+            <a:r>
+              <a:rPr lang="en-US" dirty="0"/>
+              <a:t>(</a:t>
+            </a:r>
+            <a:r>
+              <a:rPr lang="en-US" u="sng" dirty="0">
+                <a:hlinkClick r:id="rId2"/>
+              </a:rPr>
+              <a:t>https://colororacle.org/index.html</a:t>
+            </a:r>
+            <a:r>
+              <a:rPr lang="en-US" u="sng" dirty="0"/>
+              <a:t>)</a:t>
+            </a:r>
             <a:endParaRPr lang="en-US" dirty="0"/>
           </a:p>
           <a:p>
@@ -9444,7 +9462,7 @@
           <a:p>
             <a:fld id="{0C058645-6F24-9C43-8FC3-443F02031404}" type="datetime1">
               <a:rPr lang="en-US" smtClean="0"/>
-              <a:t>11/16/21</a:t>
+              <a:t>11/17/21</a:t>
             </a:fld>
             <a:endParaRPr lang="en-US" dirty="0"/>
           </a:p>
@@ -9496,14 +9514,14 @@
           <p:nvPr/>
         </p:nvPicPr>
         <p:blipFill>
-          <a:blip r:embed="rId2"/>
+          <a:blip r:embed="rId3"/>
           <a:stretch>
             <a:fillRect/>
           </a:stretch>
         </p:blipFill>
         <p:spPr>
           <a:xfrm>
-            <a:off x="1057402" y="3730711"/>
+            <a:off x="1057402" y="3848100"/>
             <a:ext cx="9004300" cy="3009900"/>
           </a:xfrm>
           <a:prstGeom prst="rect">
@@ -9671,7 +9689,7 @@
           <a:p>
             <a:fld id="{0C058645-6F24-9C43-8FC3-443F02031404}" type="datetime1">
               <a:rPr lang="en-US" smtClean="0"/>
-              <a:t>11/16/21</a:t>
+              <a:t>11/17/21</a:t>
             </a:fld>
             <a:endParaRPr lang="en-US" dirty="0"/>
           </a:p>
@@ -9834,7 +9852,7 @@
           <a:p>
             <a:fld id="{453754D5-8BE9-294A-B481-283E1E39E0CC}" type="datetime1">
               <a:rPr lang="en-US" smtClean="0"/>
-              <a:t>11/16/21</a:t>
+              <a:t>11/17/21</a:t>
             </a:fld>
             <a:endParaRPr lang="en-US" dirty="0"/>
           </a:p>
@@ -9994,15 +10012,13 @@
           <a:p>
             <a:r>
               <a:rPr lang="en-US" dirty="0"/>
-              <a:t>Finishing Up From Session 2: </a:t>
-            </a:r>
-            <a:br>
-              <a:rPr lang="en-US" dirty="0"/>
-            </a:br>
-            <a:r>
-              <a:rPr lang="en-US" dirty="0"/>
-              <a:t>Corrections + Analysis</a:t>
-            </a:r>
+              <a:t>Finishing Up From Session 2</a:t>
+            </a:r>
+            <a:r>
+              <a:rPr lang="en-US"/>
+              <a:t>: </a:t>
+            </a:r>
+            <a:endParaRPr lang="en-US" dirty="0"/>
           </a:p>
         </p:txBody>
       </p:sp>
@@ -10029,7 +10045,7 @@
           <a:p>
             <a:fld id="{0C058645-6F24-9C43-8FC3-443F02031404}" type="datetime1">
               <a:rPr lang="en-US" smtClean="0"/>
-              <a:t>11/16/21</a:t>
+              <a:t>11/17/21</a:t>
             </a:fld>
             <a:endParaRPr lang="en-US" dirty="0"/>
           </a:p>
@@ -10366,7 +10382,7 @@
           <a:p>
             <a:fld id="{453754D5-8BE9-294A-B481-283E1E39E0CC}" type="datetime1">
               <a:rPr lang="en-US" smtClean="0"/>
-              <a:t>11/16/21</a:t>
+              <a:t>11/17/21</a:t>
             </a:fld>
             <a:endParaRPr lang="en-US" dirty="0"/>
           </a:p>
@@ -10602,7 +10618,7 @@
           <a:p>
             <a:fld id="{0C058645-6F24-9C43-8FC3-443F02031404}" type="datetime1">
               <a:rPr lang="en-US" smtClean="0"/>
-              <a:t>11/16/21</a:t>
+              <a:t>11/17/21</a:t>
             </a:fld>
             <a:endParaRPr lang="en-US" dirty="0"/>
           </a:p>
@@ -10807,7 +10823,7 @@
           <a:p>
             <a:fld id="{0C058645-6F24-9C43-8FC3-443F02031404}" type="datetime1">
               <a:rPr lang="en-US" smtClean="0"/>
-              <a:t>11/16/21</a:t>
+              <a:t>11/17/21</a:t>
             </a:fld>
             <a:endParaRPr lang="en-US" dirty="0"/>
           </a:p>
@@ -11056,7 +11072,7 @@
           <a:p>
             <a:fld id="{0C058645-6F24-9C43-8FC3-443F02031404}" type="datetime1">
               <a:rPr lang="en-US" smtClean="0"/>
-              <a:t>11/16/21</a:t>
+              <a:t>11/17/21</a:t>
             </a:fld>
             <a:endParaRPr lang="en-US" dirty="0"/>
           </a:p>
@@ -11280,7 +11296,7 @@
           <a:p>
             <a:fld id="{0C058645-6F24-9C43-8FC3-443F02031404}" type="datetime1">
               <a:rPr lang="en-US" smtClean="0"/>
-              <a:t>11/16/21</a:t>
+              <a:t>11/17/21</a:t>
             </a:fld>
             <a:endParaRPr lang="en-US" dirty="0"/>
           </a:p>

</xml_diff>